<commit_message>
Added confidence level after each extraction
</commit_message>
<xml_diff>
--- a/outputs/Inspection_Plan_18_output.pptx
+++ b/outputs/Inspection_Plan_18_output.pptx
@@ -5435,8 +5435,13 @@
                     <a:bodyPr/>
                     <a:lstStyle/>
                     <a:p>
+                      <a:pPr>
+                        <a:defRPr sz="900">
+                          <a:latin typeface="Arial"/>
+                        </a:defRPr>
+                      </a:pPr>
                       <a:r>
-                        <a:t>-</a:t>
+                        <a:t>1</a:t>
                       </a:r>
                     </a:p>
                   </a:txBody>
@@ -5484,8 +5489,13 @@
                     <a:bodyPr/>
                     <a:lstStyle/>
                     <a:p>
+                      <a:pPr>
+                        <a:defRPr sz="900">
+                          <a:latin typeface="Arial"/>
+                        </a:defRPr>
+                      </a:pPr>
                       <a:r>
-                        <a:t>-</a:t>
+                        <a:t>Shell</a:t>
                       </a:r>
                     </a:p>
                   </a:txBody>
@@ -5532,7 +5542,16 @@
                   <a:txBody>
                     <a:bodyPr/>
                     <a:lstStyle/>
-                    <a:p/>
+                    <a:p>
+                      <a:pPr>
+                        <a:defRPr sz="900">
+                          <a:latin typeface="Arial"/>
+                        </a:defRPr>
+                      </a:pPr>
+                      <a:r>
+                        <a:t>-</a:t>
+                      </a:r>
+                    </a:p>
                   </a:txBody>
                   <a:tcPr marL="83125" marR="83125" marT="45725" marB="45725" anchor="ctr">
                     <a:lnL w="9525" cap="flat" cmpd="sng">
@@ -5577,7 +5596,16 @@
                   <a:txBody>
                     <a:bodyPr/>
                     <a:lstStyle/>
-                    <a:p/>
+                    <a:p>
+                      <a:pPr>
+                        <a:defRPr sz="900">
+                          <a:latin typeface="Arial"/>
+                        </a:defRPr>
+                      </a:pPr>
+                      <a:r>
+                        <a:t>Carbon Steel</a:t>
+                      </a:r>
+                    </a:p>
                   </a:txBody>
                   <a:tcPr marL="83125" marR="83125" marT="45725" marB="45725" anchor="ctr">
                     <a:lnL w="9525" cap="flat" cmpd="sng">
@@ -5622,7 +5650,16 @@
                   <a:txBody>
                     <a:bodyPr/>
                     <a:lstStyle/>
-                    <a:p/>
+                    <a:p>
+                      <a:pPr>
+                        <a:defRPr sz="900">
+                          <a:latin typeface="Arial"/>
+                        </a:defRPr>
+                      </a:pPr>
+                      <a:r>
+                        <a:t>SA-516</a:t>
+                      </a:r>
+                    </a:p>
                   </a:txBody>
                   <a:tcPr marL="83125" marR="83125" marT="45725" marB="45725" anchor="ctr">
                     <a:lnL w="9525" cap="flat" cmpd="sng">
@@ -5667,7 +5704,16 @@
                   <a:txBody>
                     <a:bodyPr/>
                     <a:lstStyle/>
-                    <a:p/>
+                    <a:p>
+                      <a:pPr>
+                        <a:defRPr sz="900">
+                          <a:latin typeface="Arial"/>
+                        </a:defRPr>
+                      </a:pPr>
+                      <a:r>
+                        <a:t>70</a:t>
+                      </a:r>
+                    </a:p>
                   </a:txBody>
                   <a:tcPr marL="83125" marR="83125" marT="45725" marB="45725" anchor="ctr">
                     <a:lnL w="9525" cap="flat" cmpd="sng">
@@ -5713,8 +5759,13 @@
                     <a:bodyPr/>
                     <a:lstStyle/>
                     <a:p>
+                      <a:pPr>
+                        <a:defRPr sz="900">
+                          <a:latin typeface="Arial"/>
+                        </a:defRPr>
+                      </a:pPr>
                       <a:r>
-                        <a:t>-</a:t>
+                        <a:t>No</a:t>
                       </a:r>
                     </a:p>
                   </a:txBody>
@@ -5761,7 +5812,16 @@
                   <a:txBody>
                     <a:bodyPr/>
                     <a:lstStyle/>
-                    <a:p/>
+                    <a:p>
+                      <a:pPr>
+                        <a:defRPr sz="900">
+                          <a:latin typeface="Arial"/>
+                        </a:defRPr>
+                      </a:pPr>
+                      <a:r>
+                        <a:t>80 C</a:t>
+                      </a:r>
+                    </a:p>
                   </a:txBody>
                   <a:tcPr marL="0" marR="0" marT="0" marB="0" anchor="ctr">
                     <a:lnL w="9525" cap="flat" cmpd="sng">
@@ -5806,7 +5866,16 @@
                   <a:txBody>
                     <a:bodyPr/>
                     <a:lstStyle/>
-                    <a:p/>
+                    <a:p>
+                      <a:pPr>
+                        <a:defRPr sz="900">
+                          <a:latin typeface="Arial"/>
+                        </a:defRPr>
+                      </a:pPr>
+                      <a:r>
+                        <a:t>8 Bar</a:t>
+                      </a:r>
+                    </a:p>
                   </a:txBody>
                   <a:tcPr marL="0" marR="0" marT="0" marB="0" anchor="ctr">
                     <a:lnL w="9525" cap="flat" cmpd="sng">
@@ -5851,7 +5920,83 @@
                   <a:txBody>
                     <a:bodyPr/>
                     <a:lstStyle/>
-                    <a:p/>
+                    <a:p>
+                      <a:pPr marL="0" marR="0" lvl="0" indent="0" algn="ctr" rtl="0">
+                        <a:spcBef>
+                          <a:spcPts val="0"/>
+                        </a:spcBef>
+                        <a:spcAft>
+                          <a:spcPts val="0"/>
+                        </a:spcAft>
+                        <a:buNone/>
+                      </a:pPr>
+                      <a:endParaRPr sz="800" dirty="0">
+                        <a:latin typeface="Arial"/>
+                        <a:ea typeface="Arial"/>
+                        <a:cs typeface="Arial"/>
+                        <a:sym typeface="Arial"/>
+                      </a:endParaRPr>
+                    </a:p>
+                    <a:p>
+                      <a:pPr marL="0" marR="0" lvl="0" indent="0" algn="ctr" rtl="0">
+                        <a:spcBef>
+                          <a:spcPts val="0"/>
+                        </a:spcBef>
+                        <a:spcAft>
+                          <a:spcPts val="0"/>
+                        </a:spcAft>
+                        <a:buNone/>
+                      </a:pPr>
+                      <a:endParaRPr sz="800" dirty="0">
+                        <a:latin typeface="Arial"/>
+                        <a:ea typeface="Arial"/>
+                        <a:cs typeface="Arial"/>
+                        <a:sym typeface="Arial"/>
+                      </a:endParaRPr>
+                    </a:p>
+                    <a:p>
+                      <a:pPr marL="0" marR="0" lvl="0" indent="0" algn="ctr" rtl="0">
+                        <a:spcBef>
+                          <a:spcPts val="0"/>
+                        </a:spcBef>
+                        <a:spcAft>
+                          <a:spcPts val="0"/>
+                        </a:spcAft>
+                        <a:buNone/>
+                      </a:pPr>
+                      <a:r>
+                        <a:rPr lang="en-MY" sz="800" dirty="0">
+                          <a:latin typeface="Arial"/>
+                          <a:ea typeface="Arial"/>
+                          <a:cs typeface="Arial"/>
+                          <a:sym typeface="Arial"/>
+                        </a:rPr>
+                        <a:t>LOW</a:t>
+                      </a:r>
+                      <a:endParaRPr sz="800" dirty="0">
+                        <a:latin typeface="Arial"/>
+                        <a:ea typeface="Arial"/>
+                        <a:cs typeface="Arial"/>
+                        <a:sym typeface="Arial"/>
+                      </a:endParaRPr>
+                    </a:p>
+                    <a:p>
+                      <a:pPr marL="0" marR="0" lvl="0" indent="0" algn="ctr" rtl="0">
+                        <a:spcBef>
+                          <a:spcPts val="0"/>
+                        </a:spcBef>
+                        <a:spcAft>
+                          <a:spcPts val="0"/>
+                        </a:spcAft>
+                        <a:buNone/>
+                      </a:pPr>
+                      <a:endParaRPr sz="800" dirty="0">
+                        <a:latin typeface="Arial"/>
+                        <a:ea typeface="Arial"/>
+                        <a:cs typeface="Arial"/>
+                        <a:sym typeface="Arial"/>
+                      </a:endParaRPr>
+                    </a:p>
                   </a:txBody>
                   <a:tcPr marL="83125" marR="83125" marT="45725" marB="45725">
                     <a:lnL w="9525" cap="flat" cmpd="sng">
@@ -5917,6 +6062,11 @@
                     <a:bodyPr/>
                     <a:lstStyle/>
                     <a:p>
+                      <a:pPr>
+                        <a:defRPr sz="900">
+                          <a:latin typeface="Arial"/>
+                        </a:defRPr>
+                      </a:pPr>
                       <a:r>
                         <a:t>-</a:t>
                       </a:r>
@@ -5966,8 +6116,13 @@
                     <a:bodyPr/>
                     <a:lstStyle/>
                     <a:p>
+                      <a:pPr>
+                        <a:defRPr sz="900">
+                          <a:latin typeface="Arial"/>
+                        </a:defRPr>
+                      </a:pPr>
                       <a:r>
-                        <a:t>-</a:t>
+                        <a:t>Top Head</a:t>
                       </a:r>
                     </a:p>
                   </a:txBody>
@@ -6014,7 +6169,16 @@
                   <a:txBody>
                     <a:bodyPr/>
                     <a:lstStyle/>
-                    <a:p/>
+                    <a:p>
+                      <a:pPr>
+                        <a:defRPr sz="900">
+                          <a:latin typeface="Arial"/>
+                        </a:defRPr>
+                      </a:pPr>
+                      <a:r>
+                        <a:t>-</a:t>
+                      </a:r>
+                    </a:p>
                   </a:txBody>
                   <a:tcPr marL="83125" marR="83125" marT="45725" marB="45725" anchor="ctr">
                     <a:lnL w="9525" cap="flat" cmpd="sng">
@@ -6059,7 +6223,16 @@
                   <a:txBody>
                     <a:bodyPr/>
                     <a:lstStyle/>
-                    <a:p/>
+                    <a:p>
+                      <a:pPr>
+                        <a:defRPr sz="900">
+                          <a:latin typeface="Arial"/>
+                        </a:defRPr>
+                      </a:pPr>
+                      <a:r>
+                        <a:t>Carbon Steel</a:t>
+                      </a:r>
+                    </a:p>
                   </a:txBody>
                   <a:tcPr marL="83125" marR="83125" marT="45725" marB="45725" anchor="ctr">
                     <a:lnL w="9525" cap="flat" cmpd="sng">
@@ -6104,7 +6277,16 @@
                   <a:txBody>
                     <a:bodyPr/>
                     <a:lstStyle/>
-                    <a:p/>
+                    <a:p>
+                      <a:pPr>
+                        <a:defRPr sz="900">
+                          <a:latin typeface="Arial"/>
+                        </a:defRPr>
+                      </a:pPr>
+                      <a:r>
+                        <a:t>SA-516</a:t>
+                      </a:r>
+                    </a:p>
                   </a:txBody>
                   <a:tcPr marL="83125" marR="83125" marT="45725" marB="45725" anchor="ctr">
                     <a:lnL w="9525" cap="flat" cmpd="sng">
@@ -6149,7 +6331,16 @@
                   <a:txBody>
                     <a:bodyPr/>
                     <a:lstStyle/>
-                    <a:p/>
+                    <a:p>
+                      <a:pPr>
+                        <a:defRPr sz="900">
+                          <a:latin typeface="Arial"/>
+                        </a:defRPr>
+                      </a:pPr>
+                      <a:r>
+                        <a:t>70</a:t>
+                      </a:r>
+                    </a:p>
                   </a:txBody>
                   <a:tcPr marL="83125" marR="83125" marT="45725" marB="45725" anchor="ctr">
                     <a:lnL w="9525" cap="flat" cmpd="sng">
@@ -6195,8 +6386,13 @@
                     <a:bodyPr/>
                     <a:lstStyle/>
                     <a:p>
+                      <a:pPr>
+                        <a:defRPr sz="900">
+                          <a:latin typeface="Arial"/>
+                        </a:defRPr>
+                      </a:pPr>
                       <a:r>
-                        <a:t>-</a:t>
+                        <a:t>No</a:t>
                       </a:r>
                     </a:p>
                   </a:txBody>
@@ -6243,7 +6439,16 @@
                   <a:txBody>
                     <a:bodyPr/>
                     <a:lstStyle/>
-                    <a:p/>
+                    <a:p>
+                      <a:pPr>
+                        <a:defRPr sz="900">
+                          <a:latin typeface="Arial"/>
+                        </a:defRPr>
+                      </a:pPr>
+                      <a:r>
+                        <a:t>80 C</a:t>
+                      </a:r>
+                    </a:p>
                   </a:txBody>
                   <a:tcPr marL="0" marR="0" marT="0" marB="0" anchor="ctr">
                     <a:lnL w="9525" cap="flat" cmpd="sng">
@@ -6288,7 +6493,1042 @@
                   <a:txBody>
                     <a:bodyPr/>
                     <a:lstStyle/>
-                    <a:p/>
+                    <a:p>
+                      <a:pPr>
+                        <a:defRPr sz="900">
+                          <a:latin typeface="Arial"/>
+                        </a:defRPr>
+                      </a:pPr>
+                      <a:r>
+                        <a:t>8 Bar</a:t>
+                      </a:r>
+                    </a:p>
+                  </a:txBody>
+                  <a:tcPr marL="0" marR="0" marT="0" marB="0" anchor="ctr">
+                    <a:lnL w="9525" cap="flat" cmpd="sng">
+                      <a:solidFill>
+                        <a:schemeClr val="dk1"/>
+                      </a:solidFill>
+                      <a:prstDash val="solid"/>
+                      <a:round/>
+                      <a:headEnd type="none" w="sm" len="sm"/>
+                      <a:tailEnd type="none" w="sm" len="sm"/>
+                    </a:lnL>
+                    <a:lnR w="9525" cap="flat" cmpd="sng">
+                      <a:solidFill>
+                        <a:schemeClr val="dk1"/>
+                      </a:solidFill>
+                      <a:prstDash val="solid"/>
+                      <a:round/>
+                      <a:headEnd type="none" w="sm" len="sm"/>
+                      <a:tailEnd type="none" w="sm" len="sm"/>
+                    </a:lnR>
+                    <a:lnT w="9525" cap="flat" cmpd="sng">
+                      <a:solidFill>
+                        <a:schemeClr val="dk1"/>
+                      </a:solidFill>
+                      <a:prstDash val="solid"/>
+                      <a:round/>
+                      <a:headEnd type="none" w="sm" len="sm"/>
+                      <a:tailEnd type="none" w="sm" len="sm"/>
+                    </a:lnT>
+                    <a:lnB w="9525" cap="flat" cmpd="sng">
+                      <a:solidFill>
+                        <a:schemeClr val="dk1"/>
+                      </a:solidFill>
+                      <a:prstDash val="solid"/>
+                      <a:round/>
+                      <a:headEnd type="none" w="sm" len="sm"/>
+                      <a:tailEnd type="none" w="sm" len="sm"/>
+                    </a:lnB>
+                  </a:tcPr>
+                </a:tc>
+                <a:tc vMerge="1">
+                  <a:txBody>
+                    <a:bodyPr/>
+                    <a:lstStyle/>
+                    <a:p>
+                      <a:endParaRPr lang="en-US"/>
+                    </a:p>
+                  </a:txBody>
+                  <a:tcPr/>
+                </a:tc>
+                <a:tc vMerge="1">
+                  <a:txBody>
+                    <a:bodyPr/>
+                    <a:lstStyle/>
+                    <a:p>
+                      <a:endParaRPr lang="en-US"/>
+                    </a:p>
+                  </a:txBody>
+                  <a:tcPr/>
+                </a:tc>
+                <a:extLst>
+                  <a:ext uri="{0D108BD9-81ED-4DB2-BD59-A6C34878D82A}">
+                    <a16:rowId xmlns:a16="http://schemas.microsoft.com/office/drawing/2014/main" val="10003"/>
+                  </a:ext>
+                </a:extLst>
+              </a:tr>
+              <a:tr h="243125">
+                <a:tc>
+                  <a:txBody>
+                    <a:bodyPr/>
+                    <a:lstStyle/>
+                    <a:p>
+                      <a:pPr>
+                        <a:defRPr sz="900">
+                          <a:latin typeface="Arial"/>
+                        </a:defRPr>
+                      </a:pPr>
+                      <a:r>
+                        <a:t>-</a:t>
+                      </a:r>
+                    </a:p>
+                  </a:txBody>
+                  <a:tcPr marL="0" marR="0" marT="0" marB="0" anchor="ctr">
+                    <a:lnL w="9525" cap="flat" cmpd="sng">
+                      <a:solidFill>
+                        <a:schemeClr val="dk1"/>
+                      </a:solidFill>
+                      <a:prstDash val="solid"/>
+                      <a:round/>
+                      <a:headEnd type="none" w="sm" len="sm"/>
+                      <a:tailEnd type="none" w="sm" len="sm"/>
+                    </a:lnL>
+                    <a:lnR w="9525" cap="flat" cmpd="sng">
+                      <a:solidFill>
+                        <a:schemeClr val="dk1"/>
+                      </a:solidFill>
+                      <a:prstDash val="solid"/>
+                      <a:round/>
+                      <a:headEnd type="none" w="sm" len="sm"/>
+                      <a:tailEnd type="none" w="sm" len="sm"/>
+                    </a:lnR>
+                    <a:lnT w="9525" cap="flat" cmpd="sng">
+                      <a:solidFill>
+                        <a:schemeClr val="dk1"/>
+                      </a:solidFill>
+                      <a:prstDash val="solid"/>
+                      <a:round/>
+                      <a:headEnd type="none" w="sm" len="sm"/>
+                      <a:tailEnd type="none" w="sm" len="sm"/>
+                    </a:lnT>
+                    <a:lnB w="9525" cap="flat" cmpd="sng">
+                      <a:solidFill>
+                        <a:schemeClr val="dk1"/>
+                      </a:solidFill>
+                      <a:prstDash val="solid"/>
+                      <a:round/>
+                      <a:headEnd type="none" w="sm" len="sm"/>
+                      <a:tailEnd type="none" w="sm" len="sm"/>
+                    </a:lnB>
+                  </a:tcPr>
+                </a:tc>
+                <a:tc>
+                  <a:txBody>
+                    <a:bodyPr/>
+                    <a:lstStyle/>
+                    <a:p>
+                      <a:pPr>
+                        <a:defRPr sz="900">
+                          <a:latin typeface="Arial"/>
+                        </a:defRPr>
+                      </a:pPr>
+                      <a:r>
+                        <a:t>Bottom Head</a:t>
+                      </a:r>
+                    </a:p>
+                  </a:txBody>
+                  <a:tcPr marL="0" marR="0" marT="0" marB="0" anchor="ctr">
+                    <a:lnL w="9525" cap="flat" cmpd="sng">
+                      <a:solidFill>
+                        <a:schemeClr val="dk1"/>
+                      </a:solidFill>
+                      <a:prstDash val="solid"/>
+                      <a:round/>
+                      <a:headEnd type="none" w="sm" len="sm"/>
+                      <a:tailEnd type="none" w="sm" len="sm"/>
+                    </a:lnL>
+                    <a:lnR w="9525" cap="flat" cmpd="sng">
+                      <a:solidFill>
+                        <a:schemeClr val="dk1"/>
+                      </a:solidFill>
+                      <a:prstDash val="solid"/>
+                      <a:round/>
+                      <a:headEnd type="none" w="sm" len="sm"/>
+                      <a:tailEnd type="none" w="sm" len="sm"/>
+                    </a:lnR>
+                    <a:lnT w="9525" cap="flat" cmpd="sng">
+                      <a:solidFill>
+                        <a:schemeClr val="dk1"/>
+                      </a:solidFill>
+                      <a:prstDash val="solid"/>
+                      <a:round/>
+                      <a:headEnd type="none" w="sm" len="sm"/>
+                      <a:tailEnd type="none" w="sm" len="sm"/>
+                    </a:lnT>
+                    <a:lnB w="9525" cap="flat" cmpd="sng">
+                      <a:solidFill>
+                        <a:schemeClr val="dk1"/>
+                      </a:solidFill>
+                      <a:prstDash val="solid"/>
+                      <a:round/>
+                      <a:headEnd type="none" w="sm" len="sm"/>
+                      <a:tailEnd type="none" w="sm" len="sm"/>
+                    </a:lnB>
+                  </a:tcPr>
+                </a:tc>
+                <a:tc>
+                  <a:txBody>
+                    <a:bodyPr/>
+                    <a:lstStyle/>
+                    <a:p>
+                      <a:pPr>
+                        <a:defRPr sz="900">
+                          <a:latin typeface="Arial"/>
+                        </a:defRPr>
+                      </a:pPr>
+                      <a:r>
+                        <a:t>-</a:t>
+                      </a:r>
+                    </a:p>
+                  </a:txBody>
+                  <a:tcPr marL="83125" marR="83125" marT="45725" marB="45725" anchor="ctr">
+                    <a:lnL w="9525" cap="flat" cmpd="sng">
+                      <a:solidFill>
+                        <a:schemeClr val="dk1"/>
+                      </a:solidFill>
+                      <a:prstDash val="solid"/>
+                      <a:round/>
+                      <a:headEnd type="none" w="sm" len="sm"/>
+                      <a:tailEnd type="none" w="sm" len="sm"/>
+                    </a:lnL>
+                    <a:lnR w="9525" cap="flat" cmpd="sng">
+                      <a:solidFill>
+                        <a:schemeClr val="dk1"/>
+                      </a:solidFill>
+                      <a:prstDash val="solid"/>
+                      <a:round/>
+                      <a:headEnd type="none" w="sm" len="sm"/>
+                      <a:tailEnd type="none" w="sm" len="sm"/>
+                    </a:lnR>
+                    <a:lnT w="9525" cap="flat" cmpd="sng">
+                      <a:solidFill>
+                        <a:schemeClr val="dk1"/>
+                      </a:solidFill>
+                      <a:prstDash val="solid"/>
+                      <a:round/>
+                      <a:headEnd type="none" w="sm" len="sm"/>
+                      <a:tailEnd type="none" w="sm" len="sm"/>
+                    </a:lnT>
+                    <a:lnB w="9525" cap="flat" cmpd="sng">
+                      <a:solidFill>
+                        <a:schemeClr val="dk1"/>
+                      </a:solidFill>
+                      <a:prstDash val="solid"/>
+                      <a:round/>
+                      <a:headEnd type="none" w="sm" len="sm"/>
+                      <a:tailEnd type="none" w="sm" len="sm"/>
+                    </a:lnB>
+                  </a:tcPr>
+                </a:tc>
+                <a:tc>
+                  <a:txBody>
+                    <a:bodyPr/>
+                    <a:lstStyle/>
+                    <a:p>
+                      <a:pPr>
+                        <a:defRPr sz="900">
+                          <a:latin typeface="Arial"/>
+                        </a:defRPr>
+                      </a:pPr>
+                      <a:r>
+                        <a:t>Carbon Steel</a:t>
+                      </a:r>
+                    </a:p>
+                  </a:txBody>
+                  <a:tcPr marL="83125" marR="83125" marT="45725" marB="45725" anchor="ctr">
+                    <a:lnL w="9525" cap="flat" cmpd="sng">
+                      <a:solidFill>
+                        <a:schemeClr val="dk1"/>
+                      </a:solidFill>
+                      <a:prstDash val="solid"/>
+                      <a:round/>
+                      <a:headEnd type="none" w="sm" len="sm"/>
+                      <a:tailEnd type="none" w="sm" len="sm"/>
+                    </a:lnL>
+                    <a:lnR w="9525" cap="flat" cmpd="sng">
+                      <a:solidFill>
+                        <a:schemeClr val="dk1"/>
+                      </a:solidFill>
+                      <a:prstDash val="solid"/>
+                      <a:round/>
+                      <a:headEnd type="none" w="sm" len="sm"/>
+                      <a:tailEnd type="none" w="sm" len="sm"/>
+                    </a:lnR>
+                    <a:lnT w="9525" cap="flat" cmpd="sng">
+                      <a:solidFill>
+                        <a:schemeClr val="dk1"/>
+                      </a:solidFill>
+                      <a:prstDash val="solid"/>
+                      <a:round/>
+                      <a:headEnd type="none" w="sm" len="sm"/>
+                      <a:tailEnd type="none" w="sm" len="sm"/>
+                    </a:lnT>
+                    <a:lnB w="9525" cap="flat" cmpd="sng">
+                      <a:solidFill>
+                        <a:schemeClr val="dk1"/>
+                      </a:solidFill>
+                      <a:prstDash val="solid"/>
+                      <a:round/>
+                      <a:headEnd type="none" w="sm" len="sm"/>
+                      <a:tailEnd type="none" w="sm" len="sm"/>
+                    </a:lnB>
+                  </a:tcPr>
+                </a:tc>
+                <a:tc>
+                  <a:txBody>
+                    <a:bodyPr/>
+                    <a:lstStyle/>
+                    <a:p>
+                      <a:pPr>
+                        <a:defRPr sz="900">
+                          <a:latin typeface="Arial"/>
+                        </a:defRPr>
+                      </a:pPr>
+                      <a:r>
+                        <a:t>SA-516</a:t>
+                      </a:r>
+                    </a:p>
+                  </a:txBody>
+                  <a:tcPr marL="83125" marR="83125" marT="45725" marB="45725" anchor="ctr">
+                    <a:lnL w="9525" cap="flat" cmpd="sng">
+                      <a:solidFill>
+                        <a:schemeClr val="dk1"/>
+                      </a:solidFill>
+                      <a:prstDash val="solid"/>
+                      <a:round/>
+                      <a:headEnd type="none" w="sm" len="sm"/>
+                      <a:tailEnd type="none" w="sm" len="sm"/>
+                    </a:lnL>
+                    <a:lnR w="9525" cap="flat" cmpd="sng">
+                      <a:solidFill>
+                        <a:schemeClr val="dk1"/>
+                      </a:solidFill>
+                      <a:prstDash val="solid"/>
+                      <a:round/>
+                      <a:headEnd type="none" w="sm" len="sm"/>
+                      <a:tailEnd type="none" w="sm" len="sm"/>
+                    </a:lnR>
+                    <a:lnT w="9525" cap="flat" cmpd="sng">
+                      <a:solidFill>
+                        <a:schemeClr val="dk1"/>
+                      </a:solidFill>
+                      <a:prstDash val="solid"/>
+                      <a:round/>
+                      <a:headEnd type="none" w="sm" len="sm"/>
+                      <a:tailEnd type="none" w="sm" len="sm"/>
+                    </a:lnT>
+                    <a:lnB w="9525" cap="flat" cmpd="sng">
+                      <a:solidFill>
+                        <a:schemeClr val="dk1"/>
+                      </a:solidFill>
+                      <a:prstDash val="solid"/>
+                      <a:round/>
+                      <a:headEnd type="none" w="sm" len="sm"/>
+                      <a:tailEnd type="none" w="sm" len="sm"/>
+                    </a:lnB>
+                  </a:tcPr>
+                </a:tc>
+                <a:tc>
+                  <a:txBody>
+                    <a:bodyPr/>
+                    <a:lstStyle/>
+                    <a:p>
+                      <a:pPr>
+                        <a:defRPr sz="900">
+                          <a:latin typeface="Arial"/>
+                        </a:defRPr>
+                      </a:pPr>
+                      <a:r>
+                        <a:t>70</a:t>
+                      </a:r>
+                    </a:p>
+                  </a:txBody>
+                  <a:tcPr marL="83125" marR="83125" marT="45725" marB="45725" anchor="ctr">
+                    <a:lnL w="9525" cap="flat" cmpd="sng">
+                      <a:solidFill>
+                        <a:schemeClr val="dk1"/>
+                      </a:solidFill>
+                      <a:prstDash val="solid"/>
+                      <a:round/>
+                      <a:headEnd type="none" w="sm" len="sm"/>
+                      <a:tailEnd type="none" w="sm" len="sm"/>
+                    </a:lnL>
+                    <a:lnR w="9525" cap="flat" cmpd="sng">
+                      <a:solidFill>
+                        <a:schemeClr val="dk1"/>
+                      </a:solidFill>
+                      <a:prstDash val="solid"/>
+                      <a:round/>
+                      <a:headEnd type="none" w="sm" len="sm"/>
+                      <a:tailEnd type="none" w="sm" len="sm"/>
+                    </a:lnR>
+                    <a:lnT w="9525" cap="flat" cmpd="sng">
+                      <a:solidFill>
+                        <a:schemeClr val="dk1"/>
+                      </a:solidFill>
+                      <a:prstDash val="solid"/>
+                      <a:round/>
+                      <a:headEnd type="none" w="sm" len="sm"/>
+                      <a:tailEnd type="none" w="sm" len="sm"/>
+                    </a:lnT>
+                    <a:lnB w="9525" cap="flat" cmpd="sng">
+                      <a:solidFill>
+                        <a:schemeClr val="dk1"/>
+                      </a:solidFill>
+                      <a:prstDash val="solid"/>
+                      <a:round/>
+                      <a:headEnd type="none" w="sm" len="sm"/>
+                      <a:tailEnd type="none" w="sm" len="sm"/>
+                    </a:lnB>
+                  </a:tcPr>
+                </a:tc>
+                <a:tc>
+                  <a:txBody>
+                    <a:bodyPr/>
+                    <a:lstStyle/>
+                    <a:p>
+                      <a:pPr>
+                        <a:defRPr sz="900">
+                          <a:latin typeface="Arial"/>
+                        </a:defRPr>
+                      </a:pPr>
+                      <a:r>
+                        <a:t>No</a:t>
+                      </a:r>
+                    </a:p>
+                  </a:txBody>
+                  <a:tcPr marL="83125" marR="83125" marT="45725" marB="45725" anchor="ctr">
+                    <a:lnL w="9525" cap="flat" cmpd="sng">
+                      <a:solidFill>
+                        <a:schemeClr val="dk1"/>
+                      </a:solidFill>
+                      <a:prstDash val="solid"/>
+                      <a:round/>
+                      <a:headEnd type="none" w="sm" len="sm"/>
+                      <a:tailEnd type="none" w="sm" len="sm"/>
+                    </a:lnL>
+                    <a:lnR w="9525" cap="flat" cmpd="sng">
+                      <a:solidFill>
+                        <a:schemeClr val="dk1"/>
+                      </a:solidFill>
+                      <a:prstDash val="solid"/>
+                      <a:round/>
+                      <a:headEnd type="none" w="sm" len="sm"/>
+                      <a:tailEnd type="none" w="sm" len="sm"/>
+                    </a:lnR>
+                    <a:lnT w="9525" cap="flat" cmpd="sng">
+                      <a:solidFill>
+                        <a:schemeClr val="dk1"/>
+                      </a:solidFill>
+                      <a:prstDash val="solid"/>
+                      <a:round/>
+                      <a:headEnd type="none" w="sm" len="sm"/>
+                      <a:tailEnd type="none" w="sm" len="sm"/>
+                    </a:lnT>
+                    <a:lnB w="9525" cap="flat" cmpd="sng">
+                      <a:solidFill>
+                        <a:schemeClr val="dk1"/>
+                      </a:solidFill>
+                      <a:prstDash val="solid"/>
+                      <a:round/>
+                      <a:headEnd type="none" w="sm" len="sm"/>
+                      <a:tailEnd type="none" w="sm" len="sm"/>
+                    </a:lnB>
+                  </a:tcPr>
+                </a:tc>
+                <a:tc>
+                  <a:txBody>
+                    <a:bodyPr/>
+                    <a:lstStyle/>
+                    <a:p>
+                      <a:pPr>
+                        <a:defRPr sz="900">
+                          <a:latin typeface="Arial"/>
+                        </a:defRPr>
+                      </a:pPr>
+                      <a:r>
+                        <a:t>80 C</a:t>
+                      </a:r>
+                    </a:p>
+                  </a:txBody>
+                  <a:tcPr marL="0" marR="0" marT="0" marB="0" anchor="ctr">
+                    <a:lnL w="9525" cap="flat" cmpd="sng">
+                      <a:solidFill>
+                        <a:schemeClr val="dk1"/>
+                      </a:solidFill>
+                      <a:prstDash val="solid"/>
+                      <a:round/>
+                      <a:headEnd type="none" w="sm" len="sm"/>
+                      <a:tailEnd type="none" w="sm" len="sm"/>
+                    </a:lnL>
+                    <a:lnR w="9525" cap="flat" cmpd="sng">
+                      <a:solidFill>
+                        <a:schemeClr val="dk1"/>
+                      </a:solidFill>
+                      <a:prstDash val="solid"/>
+                      <a:round/>
+                      <a:headEnd type="none" w="sm" len="sm"/>
+                      <a:tailEnd type="none" w="sm" len="sm"/>
+                    </a:lnR>
+                    <a:lnT w="9525" cap="flat" cmpd="sng">
+                      <a:solidFill>
+                        <a:schemeClr val="dk1"/>
+                      </a:solidFill>
+                      <a:prstDash val="solid"/>
+                      <a:round/>
+                      <a:headEnd type="none" w="sm" len="sm"/>
+                      <a:tailEnd type="none" w="sm" len="sm"/>
+                    </a:lnT>
+                    <a:lnB w="9525" cap="flat" cmpd="sng">
+                      <a:solidFill>
+                        <a:schemeClr val="dk1"/>
+                      </a:solidFill>
+                      <a:prstDash val="solid"/>
+                      <a:round/>
+                      <a:headEnd type="none" w="sm" len="sm"/>
+                      <a:tailEnd type="none" w="sm" len="sm"/>
+                    </a:lnB>
+                  </a:tcPr>
+                </a:tc>
+                <a:tc>
+                  <a:txBody>
+                    <a:bodyPr/>
+                    <a:lstStyle/>
+                    <a:p>
+                      <a:pPr>
+                        <a:defRPr sz="900">
+                          <a:latin typeface="Arial"/>
+                        </a:defRPr>
+                      </a:pPr>
+                      <a:r>
+                        <a:t>8 Bar</a:t>
+                      </a:r>
+                    </a:p>
+                  </a:txBody>
+                  <a:tcPr marL="0" marR="0" marT="0" marB="0" anchor="ctr">
+                    <a:lnL w="9525" cap="flat" cmpd="sng">
+                      <a:solidFill>
+                        <a:schemeClr val="dk1"/>
+                      </a:solidFill>
+                      <a:prstDash val="solid"/>
+                      <a:round/>
+                      <a:headEnd type="none" w="sm" len="sm"/>
+                      <a:tailEnd type="none" w="sm" len="sm"/>
+                    </a:lnL>
+                    <a:lnR w="9525" cap="flat" cmpd="sng">
+                      <a:solidFill>
+                        <a:schemeClr val="dk1"/>
+                      </a:solidFill>
+                      <a:prstDash val="solid"/>
+                      <a:round/>
+                      <a:headEnd type="none" w="sm" len="sm"/>
+                      <a:tailEnd type="none" w="sm" len="sm"/>
+                    </a:lnR>
+                    <a:lnT w="9525" cap="flat" cmpd="sng">
+                      <a:solidFill>
+                        <a:schemeClr val="dk1"/>
+                      </a:solidFill>
+                      <a:prstDash val="solid"/>
+                      <a:round/>
+                      <a:headEnd type="none" w="sm" len="sm"/>
+                      <a:tailEnd type="none" w="sm" len="sm"/>
+                    </a:lnT>
+                    <a:lnB w="9525" cap="flat" cmpd="sng">
+                      <a:solidFill>
+                        <a:schemeClr val="dk1"/>
+                      </a:solidFill>
+                      <a:prstDash val="solid"/>
+                      <a:round/>
+                      <a:headEnd type="none" w="sm" len="sm"/>
+                      <a:tailEnd type="none" w="sm" len="sm"/>
+                    </a:lnB>
+                  </a:tcPr>
+                </a:tc>
+                <a:tc vMerge="1">
+                  <a:txBody>
+                    <a:bodyPr/>
+                    <a:lstStyle/>
+                    <a:p>
+                      <a:endParaRPr lang="en-US"/>
+                    </a:p>
+                  </a:txBody>
+                  <a:tcPr/>
+                </a:tc>
+                <a:tc vMerge="1">
+                  <a:txBody>
+                    <a:bodyPr/>
+                    <a:lstStyle/>
+                    <a:p>
+                      <a:endParaRPr lang="en-US"/>
+                    </a:p>
+                  </a:txBody>
+                  <a:tcPr/>
+                </a:tc>
+                <a:extLst>
+                  <a:ext uri="{0D108BD9-81ED-4DB2-BD59-A6C34878D82A}">
+                    <a16:rowId xmlns:a16="http://schemas.microsoft.com/office/drawing/2014/main" val="10004"/>
+                  </a:ext>
+                </a:extLst>
+              </a:tr>
+              <a:tr h="243125">
+                <a:tc>
+                  <a:txBody>
+                    <a:bodyPr/>
+                    <a:lstStyle/>
+                    <a:p>
+                      <a:pPr>
+                        <a:defRPr sz="900">
+                          <a:latin typeface="Arial"/>
+                        </a:defRPr>
+                      </a:pPr>
+                      <a:r>
+                        <a:t>-</a:t>
+                      </a:r>
+                    </a:p>
+                  </a:txBody>
+                  <a:tcPr marL="0" marR="0" marT="0" marB="0" anchor="ctr">
+                    <a:lnL w="9525" cap="flat" cmpd="sng">
+                      <a:solidFill>
+                        <a:schemeClr val="dk1"/>
+                      </a:solidFill>
+                      <a:prstDash val="solid"/>
+                      <a:round/>
+                      <a:headEnd type="none" w="sm" len="sm"/>
+                      <a:tailEnd type="none" w="sm" len="sm"/>
+                    </a:lnL>
+                    <a:lnR w="9525" cap="flat" cmpd="sng">
+                      <a:solidFill>
+                        <a:schemeClr val="dk1"/>
+                      </a:solidFill>
+                      <a:prstDash val="solid"/>
+                      <a:round/>
+                      <a:headEnd type="none" w="sm" len="sm"/>
+                      <a:tailEnd type="none" w="sm" len="sm"/>
+                    </a:lnR>
+                    <a:lnT w="9525" cap="flat" cmpd="sng">
+                      <a:solidFill>
+                        <a:schemeClr val="dk1"/>
+                      </a:solidFill>
+                      <a:prstDash val="solid"/>
+                      <a:round/>
+                      <a:headEnd type="none" w="sm" len="sm"/>
+                      <a:tailEnd type="none" w="sm" len="sm"/>
+                    </a:lnT>
+                    <a:lnB w="9525" cap="flat" cmpd="sng">
+                      <a:solidFill>
+                        <a:schemeClr val="dk1"/>
+                      </a:solidFill>
+                      <a:prstDash val="solid"/>
+                      <a:round/>
+                      <a:headEnd type="none" w="sm" len="sm"/>
+                      <a:tailEnd type="none" w="sm" len="sm"/>
+                    </a:lnB>
+                  </a:tcPr>
+                </a:tc>
+                <a:tc>
+                  <a:txBody>
+                    <a:bodyPr/>
+                    <a:lstStyle/>
+                    <a:p>
+                      <a:pPr>
+                        <a:defRPr sz="900">
+                          <a:latin typeface="Arial"/>
+                        </a:defRPr>
+                      </a:pPr>
+                      <a:r>
+                        <a:t>Pipe</a:t>
+                      </a:r>
+                    </a:p>
+                  </a:txBody>
+                  <a:tcPr marL="0" marR="0" marT="0" marB="0" anchor="ctr">
+                    <a:lnL w="9525" cap="flat" cmpd="sng">
+                      <a:solidFill>
+                        <a:schemeClr val="dk1"/>
+                      </a:solidFill>
+                      <a:prstDash val="solid"/>
+                      <a:round/>
+                      <a:headEnd type="none" w="sm" len="sm"/>
+                      <a:tailEnd type="none" w="sm" len="sm"/>
+                    </a:lnL>
+                    <a:lnR w="9525" cap="flat" cmpd="sng">
+                      <a:solidFill>
+                        <a:schemeClr val="dk1"/>
+                      </a:solidFill>
+                      <a:prstDash val="solid"/>
+                      <a:round/>
+                      <a:headEnd type="none" w="sm" len="sm"/>
+                      <a:tailEnd type="none" w="sm" len="sm"/>
+                    </a:lnR>
+                    <a:lnT w="9525" cap="flat" cmpd="sng">
+                      <a:solidFill>
+                        <a:schemeClr val="dk1"/>
+                      </a:solidFill>
+                      <a:prstDash val="solid"/>
+                      <a:round/>
+                      <a:headEnd type="none" w="sm" len="sm"/>
+                      <a:tailEnd type="none" w="sm" len="sm"/>
+                    </a:lnT>
+                    <a:lnB w="9525" cap="flat" cmpd="sng">
+                      <a:solidFill>
+                        <a:schemeClr val="dk1"/>
+                      </a:solidFill>
+                      <a:prstDash val="solid"/>
+                      <a:round/>
+                      <a:headEnd type="none" w="sm" len="sm"/>
+                      <a:tailEnd type="none" w="sm" len="sm"/>
+                    </a:lnB>
+                  </a:tcPr>
+                </a:tc>
+                <a:tc>
+                  <a:txBody>
+                    <a:bodyPr/>
+                    <a:lstStyle/>
+                    <a:p>
+                      <a:pPr>
+                        <a:defRPr sz="900">
+                          <a:latin typeface="Arial"/>
+                        </a:defRPr>
+                      </a:pPr>
+                      <a:r>
+                        <a:t>-</a:t>
+                      </a:r>
+                    </a:p>
+                  </a:txBody>
+                  <a:tcPr marL="83125" marR="83125" marT="45725" marB="45725" anchor="ctr">
+                    <a:lnL w="9525" cap="flat" cmpd="sng">
+                      <a:solidFill>
+                        <a:schemeClr val="dk1"/>
+                      </a:solidFill>
+                      <a:prstDash val="solid"/>
+                      <a:round/>
+                      <a:headEnd type="none" w="sm" len="sm"/>
+                      <a:tailEnd type="none" w="sm" len="sm"/>
+                    </a:lnL>
+                    <a:lnR w="9525" cap="flat" cmpd="sng">
+                      <a:solidFill>
+                        <a:schemeClr val="dk1"/>
+                      </a:solidFill>
+                      <a:prstDash val="solid"/>
+                      <a:round/>
+                      <a:headEnd type="none" w="sm" len="sm"/>
+                      <a:tailEnd type="none" w="sm" len="sm"/>
+                    </a:lnR>
+                    <a:lnT w="9525" cap="flat" cmpd="sng">
+                      <a:solidFill>
+                        <a:schemeClr val="dk1"/>
+                      </a:solidFill>
+                      <a:prstDash val="solid"/>
+                      <a:round/>
+                      <a:headEnd type="none" w="sm" len="sm"/>
+                      <a:tailEnd type="none" w="sm" len="sm"/>
+                    </a:lnT>
+                    <a:lnB w="9525" cap="flat" cmpd="sng">
+                      <a:solidFill>
+                        <a:schemeClr val="dk1"/>
+                      </a:solidFill>
+                      <a:prstDash val="solid"/>
+                      <a:round/>
+                      <a:headEnd type="none" w="sm" len="sm"/>
+                      <a:tailEnd type="none" w="sm" len="sm"/>
+                    </a:lnB>
+                  </a:tcPr>
+                </a:tc>
+                <a:tc>
+                  <a:txBody>
+                    <a:bodyPr/>
+                    <a:lstStyle/>
+                    <a:p>
+                      <a:pPr>
+                        <a:defRPr sz="900">
+                          <a:latin typeface="Arial"/>
+                        </a:defRPr>
+                      </a:pPr>
+                      <a:r>
+                        <a:t>Carbon Steel</a:t>
+                      </a:r>
+                    </a:p>
+                  </a:txBody>
+                  <a:tcPr marL="83125" marR="83125" marT="45725" marB="45725" anchor="ctr">
+                    <a:lnL w="9525" cap="flat" cmpd="sng">
+                      <a:solidFill>
+                        <a:schemeClr val="dk1"/>
+                      </a:solidFill>
+                      <a:prstDash val="solid"/>
+                      <a:round/>
+                      <a:headEnd type="none" w="sm" len="sm"/>
+                      <a:tailEnd type="none" w="sm" len="sm"/>
+                    </a:lnL>
+                    <a:lnR w="9525" cap="flat" cmpd="sng">
+                      <a:solidFill>
+                        <a:schemeClr val="dk1"/>
+                      </a:solidFill>
+                      <a:prstDash val="solid"/>
+                      <a:round/>
+                      <a:headEnd type="none" w="sm" len="sm"/>
+                      <a:tailEnd type="none" w="sm" len="sm"/>
+                    </a:lnR>
+                    <a:lnT w="9525" cap="flat" cmpd="sng">
+                      <a:solidFill>
+                        <a:schemeClr val="dk1"/>
+                      </a:solidFill>
+                      <a:prstDash val="solid"/>
+                      <a:round/>
+                      <a:headEnd type="none" w="sm" len="sm"/>
+                      <a:tailEnd type="none" w="sm" len="sm"/>
+                    </a:lnT>
+                    <a:lnB w="9525" cap="flat" cmpd="sng">
+                      <a:solidFill>
+                        <a:schemeClr val="dk1"/>
+                      </a:solidFill>
+                      <a:prstDash val="solid"/>
+                      <a:round/>
+                      <a:headEnd type="none" w="sm" len="sm"/>
+                      <a:tailEnd type="none" w="sm" len="sm"/>
+                    </a:lnB>
+                  </a:tcPr>
+                </a:tc>
+                <a:tc>
+                  <a:txBody>
+                    <a:bodyPr/>
+                    <a:lstStyle/>
+                    <a:p>
+                      <a:pPr>
+                        <a:defRPr sz="900">
+                          <a:latin typeface="Arial"/>
+                        </a:defRPr>
+                      </a:pPr>
+                      <a:r>
+                        <a:t>SA-106</a:t>
+                      </a:r>
+                    </a:p>
+                  </a:txBody>
+                  <a:tcPr marL="83125" marR="83125" marT="45725" marB="45725" anchor="ctr">
+                    <a:lnL w="9525" cap="flat" cmpd="sng">
+                      <a:solidFill>
+                        <a:schemeClr val="dk1"/>
+                      </a:solidFill>
+                      <a:prstDash val="solid"/>
+                      <a:round/>
+                      <a:headEnd type="none" w="sm" len="sm"/>
+                      <a:tailEnd type="none" w="sm" len="sm"/>
+                    </a:lnL>
+                    <a:lnR w="9525" cap="flat" cmpd="sng">
+                      <a:solidFill>
+                        <a:schemeClr val="dk1"/>
+                      </a:solidFill>
+                      <a:prstDash val="solid"/>
+                      <a:round/>
+                      <a:headEnd type="none" w="sm" len="sm"/>
+                      <a:tailEnd type="none" w="sm" len="sm"/>
+                    </a:lnR>
+                    <a:lnT w="9525" cap="flat" cmpd="sng">
+                      <a:solidFill>
+                        <a:schemeClr val="dk1"/>
+                      </a:solidFill>
+                      <a:prstDash val="solid"/>
+                      <a:round/>
+                      <a:headEnd type="none" w="sm" len="sm"/>
+                      <a:tailEnd type="none" w="sm" len="sm"/>
+                    </a:lnT>
+                    <a:lnB w="9525" cap="flat" cmpd="sng">
+                      <a:solidFill>
+                        <a:schemeClr val="dk1"/>
+                      </a:solidFill>
+                      <a:prstDash val="solid"/>
+                      <a:round/>
+                      <a:headEnd type="none" w="sm" len="sm"/>
+                      <a:tailEnd type="none" w="sm" len="sm"/>
+                    </a:lnB>
+                  </a:tcPr>
+                </a:tc>
+                <a:tc>
+                  <a:txBody>
+                    <a:bodyPr/>
+                    <a:lstStyle/>
+                    <a:p>
+                      <a:pPr>
+                        <a:defRPr sz="900">
+                          <a:latin typeface="Arial"/>
+                        </a:defRPr>
+                      </a:pPr>
+                      <a:r>
+                        <a:t>GR.B</a:t>
+                      </a:r>
+                    </a:p>
+                  </a:txBody>
+                  <a:tcPr marL="83125" marR="83125" marT="45725" marB="45725" anchor="ctr">
+                    <a:lnL w="9525" cap="flat" cmpd="sng">
+                      <a:solidFill>
+                        <a:schemeClr val="dk1"/>
+                      </a:solidFill>
+                      <a:prstDash val="solid"/>
+                      <a:round/>
+                      <a:headEnd type="none" w="sm" len="sm"/>
+                      <a:tailEnd type="none" w="sm" len="sm"/>
+                    </a:lnL>
+                    <a:lnR w="9525" cap="flat" cmpd="sng">
+                      <a:solidFill>
+                        <a:schemeClr val="dk1"/>
+                      </a:solidFill>
+                      <a:prstDash val="solid"/>
+                      <a:round/>
+                      <a:headEnd type="none" w="sm" len="sm"/>
+                      <a:tailEnd type="none" w="sm" len="sm"/>
+                    </a:lnR>
+                    <a:lnT w="9525" cap="flat" cmpd="sng">
+                      <a:solidFill>
+                        <a:schemeClr val="dk1"/>
+                      </a:solidFill>
+                      <a:prstDash val="solid"/>
+                      <a:round/>
+                      <a:headEnd type="none" w="sm" len="sm"/>
+                      <a:tailEnd type="none" w="sm" len="sm"/>
+                    </a:lnT>
+                    <a:lnB w="9525" cap="flat" cmpd="sng">
+                      <a:solidFill>
+                        <a:schemeClr val="dk1"/>
+                      </a:solidFill>
+                      <a:prstDash val="solid"/>
+                      <a:round/>
+                      <a:headEnd type="none" w="sm" len="sm"/>
+                      <a:tailEnd type="none" w="sm" len="sm"/>
+                    </a:lnB>
+                  </a:tcPr>
+                </a:tc>
+                <a:tc>
+                  <a:txBody>
+                    <a:bodyPr/>
+                    <a:lstStyle/>
+                    <a:p>
+                      <a:pPr>
+                        <a:defRPr sz="900">
+                          <a:latin typeface="Arial"/>
+                        </a:defRPr>
+                      </a:pPr>
+                      <a:r>
+                        <a:t>No</a:t>
+                      </a:r>
+                    </a:p>
+                  </a:txBody>
+                  <a:tcPr marL="83125" marR="83125" marT="45725" marB="45725" anchor="ctr">
+                    <a:lnL w="9525" cap="flat" cmpd="sng">
+                      <a:solidFill>
+                        <a:schemeClr val="dk1"/>
+                      </a:solidFill>
+                      <a:prstDash val="solid"/>
+                      <a:round/>
+                      <a:headEnd type="none" w="sm" len="sm"/>
+                      <a:tailEnd type="none" w="sm" len="sm"/>
+                    </a:lnL>
+                    <a:lnR w="9525" cap="flat" cmpd="sng">
+                      <a:solidFill>
+                        <a:schemeClr val="dk1"/>
+                      </a:solidFill>
+                      <a:prstDash val="solid"/>
+                      <a:round/>
+                      <a:headEnd type="none" w="sm" len="sm"/>
+                      <a:tailEnd type="none" w="sm" len="sm"/>
+                    </a:lnR>
+                    <a:lnT w="9525" cap="flat" cmpd="sng">
+                      <a:solidFill>
+                        <a:schemeClr val="dk1"/>
+                      </a:solidFill>
+                      <a:prstDash val="solid"/>
+                      <a:round/>
+                      <a:headEnd type="none" w="sm" len="sm"/>
+                      <a:tailEnd type="none" w="sm" len="sm"/>
+                    </a:lnT>
+                    <a:lnB w="9525" cap="flat" cmpd="sng">
+                      <a:solidFill>
+                        <a:schemeClr val="dk1"/>
+                      </a:solidFill>
+                      <a:prstDash val="solid"/>
+                      <a:round/>
+                      <a:headEnd type="none" w="sm" len="sm"/>
+                      <a:tailEnd type="none" w="sm" len="sm"/>
+                    </a:lnB>
+                  </a:tcPr>
+                </a:tc>
+                <a:tc>
+                  <a:txBody>
+                    <a:bodyPr/>
+                    <a:lstStyle/>
+                    <a:p>
+                      <a:pPr>
+                        <a:defRPr sz="900">
+                          <a:latin typeface="Arial"/>
+                        </a:defRPr>
+                      </a:pPr>
+                      <a:r>
+                        <a:t>80 C</a:t>
+                      </a:r>
+                    </a:p>
+                  </a:txBody>
+                  <a:tcPr marL="0" marR="0" marT="0" marB="0" anchor="ctr">
+                    <a:lnL w="9525" cap="flat" cmpd="sng">
+                      <a:solidFill>
+                        <a:schemeClr val="dk1"/>
+                      </a:solidFill>
+                      <a:prstDash val="solid"/>
+                      <a:round/>
+                      <a:headEnd type="none" w="sm" len="sm"/>
+                      <a:tailEnd type="none" w="sm" len="sm"/>
+                    </a:lnL>
+                    <a:lnR w="9525" cap="flat" cmpd="sng">
+                      <a:solidFill>
+                        <a:schemeClr val="dk1"/>
+                      </a:solidFill>
+                      <a:prstDash val="solid"/>
+                      <a:round/>
+                      <a:headEnd type="none" w="sm" len="sm"/>
+                      <a:tailEnd type="none" w="sm" len="sm"/>
+                    </a:lnR>
+                    <a:lnT w="9525" cap="flat" cmpd="sng">
+                      <a:solidFill>
+                        <a:schemeClr val="dk1"/>
+                      </a:solidFill>
+                      <a:prstDash val="solid"/>
+                      <a:round/>
+                      <a:headEnd type="none" w="sm" len="sm"/>
+                      <a:tailEnd type="none" w="sm" len="sm"/>
+                    </a:lnT>
+                    <a:lnB w="9525" cap="flat" cmpd="sng">
+                      <a:solidFill>
+                        <a:schemeClr val="dk1"/>
+                      </a:solidFill>
+                      <a:prstDash val="solid"/>
+                      <a:round/>
+                      <a:headEnd type="none" w="sm" len="sm"/>
+                      <a:tailEnd type="none" w="sm" len="sm"/>
+                    </a:lnB>
+                  </a:tcPr>
+                </a:tc>
+                <a:tc>
+                  <a:txBody>
+                    <a:bodyPr/>
+                    <a:lstStyle/>
+                    <a:p>
+                      <a:pPr>
+                        <a:defRPr sz="900">
+                          <a:latin typeface="Arial"/>
+                        </a:defRPr>
+                      </a:pPr>
+                      <a:r>
+                        <a:t>8 Bar</a:t>
+                      </a:r>
+                    </a:p>
                   </a:txBody>
                   <a:tcPr marL="0" marR="0" marT="0" marB="0" anchor="ctr">
                     <a:lnL w="9525" cap="flat" cmpd="sng">
@@ -6341,15 +7581,13 @@
                   <a:txBody>
                     <a:bodyPr/>
                     <a:lstStyle/>
-                    <a:p>
-                      <a:endParaRPr lang="en-US"/>
-                    </a:p>
+                    <a:p/>
                   </a:txBody>
                   <a:tcPr/>
                 </a:tc>
                 <a:extLst>
                   <a:ext uri="{0D108BD9-81ED-4DB2-BD59-A6C34878D82A}">
-                    <a16:rowId xmlns:a16="http://schemas.microsoft.com/office/drawing/2014/main" val="10003"/>
+                    <a16:rowId xmlns:a16="http://schemas.microsoft.com/office/drawing/2014/main" val="10004"/>
                   </a:ext>
                 </a:extLst>
               </a:tr>
@@ -6359,8 +7597,13 @@
                     <a:bodyPr/>
                     <a:lstStyle/>
                     <a:p>
+                      <a:pPr>
+                        <a:defRPr sz="900">
+                          <a:latin typeface="Arial"/>
+                        </a:defRPr>
+                      </a:pPr>
                       <a:r>
-                        <a:t>Hot Water</a:t>
+                        <a:t>-</a:t>
                       </a:r>
                     </a:p>
                   </a:txBody>
@@ -6408,8 +7651,13 @@
                     <a:bodyPr/>
                     <a:lstStyle/>
                     <a:p>
+                      <a:pPr>
+                        <a:defRPr sz="900">
+                          <a:latin typeface="Arial"/>
+                        </a:defRPr>
+                      </a:pPr>
                       <a:r>
-                        <a:t>2:1 ELLIPSOIDAL HEAD</a:t>
+                        <a:t>-</a:t>
                       </a:r>
                     </a:p>
                   </a:txBody>
@@ -6456,7 +7704,16 @@
                   <a:txBody>
                     <a:bodyPr/>
                     <a:lstStyle/>
-                    <a:p/>
+                    <a:p>
+                      <a:pPr>
+                        <a:defRPr sz="900">
+                          <a:latin typeface="Arial"/>
+                        </a:defRPr>
+                      </a:pPr>
+                      <a:r>
+                        <a:t>-</a:t>
+                      </a:r>
+                    </a:p>
                   </a:txBody>
                   <a:tcPr marL="83125" marR="83125" marT="45725" marB="45725" anchor="ctr">
                     <a:lnL w="9525" cap="flat" cmpd="sng">
@@ -6501,7 +7758,16 @@
                   <a:txBody>
                     <a:bodyPr/>
                     <a:lstStyle/>
-                    <a:p/>
+                    <a:p>
+                      <a:pPr>
+                        <a:defRPr sz="900">
+                          <a:latin typeface="Arial"/>
+                        </a:defRPr>
+                      </a:pPr>
+                      <a:r>
+                        <a:t>-</a:t>
+                      </a:r>
+                    </a:p>
                   </a:txBody>
                   <a:tcPr marL="83125" marR="83125" marT="45725" marB="45725" anchor="ctr">
                     <a:lnL w="9525" cap="flat" cmpd="sng">
@@ -6546,7 +7812,16 @@
                   <a:txBody>
                     <a:bodyPr/>
                     <a:lstStyle/>
-                    <a:p/>
+                    <a:p>
+                      <a:pPr>
+                        <a:defRPr sz="900">
+                          <a:latin typeface="Arial"/>
+                        </a:defRPr>
+                      </a:pPr>
+                      <a:r>
+                        <a:t>-</a:t>
+                      </a:r>
+                    </a:p>
                   </a:txBody>
                   <a:tcPr marL="83125" marR="83125" marT="45725" marB="45725" anchor="ctr">
                     <a:lnL w="9525" cap="flat" cmpd="sng">
@@ -6591,7 +7866,16 @@
                   <a:txBody>
                     <a:bodyPr/>
                     <a:lstStyle/>
-                    <a:p/>
+                    <a:p>
+                      <a:pPr>
+                        <a:defRPr sz="900">
+                          <a:latin typeface="Arial"/>
+                        </a:defRPr>
+                      </a:pPr>
+                      <a:r>
+                        <a:t>-</a:t>
+                      </a:r>
+                    </a:p>
                   </a:txBody>
                   <a:tcPr marL="83125" marR="83125" marT="45725" marB="45725" anchor="ctr">
                     <a:lnL w="9525" cap="flat" cmpd="sng">
@@ -6637,6 +7921,11 @@
                     <a:bodyPr/>
                     <a:lstStyle/>
                     <a:p>
+                      <a:pPr>
+                        <a:defRPr sz="900">
+                          <a:latin typeface="Arial"/>
+                        </a:defRPr>
+                      </a:pPr>
                       <a:r>
                         <a:t>-</a:t>
                       </a:r>
@@ -6685,7 +7974,16 @@
                   <a:txBody>
                     <a:bodyPr/>
                     <a:lstStyle/>
-                    <a:p/>
+                    <a:p>
+                      <a:pPr>
+                        <a:defRPr sz="900">
+                          <a:latin typeface="Arial"/>
+                        </a:defRPr>
+                      </a:pPr>
+                      <a:r>
+                        <a:t>-</a:t>
+                      </a:r>
+                    </a:p>
                   </a:txBody>
                   <a:tcPr marL="0" marR="0" marT="0" marB="0" anchor="ctr">
                     <a:lnL w="9525" cap="flat" cmpd="sng">
@@ -6730,7 +8028,16 @@
                   <a:txBody>
                     <a:bodyPr/>
                     <a:lstStyle/>
-                    <a:p/>
+                    <a:p>
+                      <a:pPr>
+                        <a:defRPr sz="900">
+                          <a:latin typeface="Arial"/>
+                        </a:defRPr>
+                      </a:pPr>
+                      <a:r>
+                        <a:t>-</a:t>
+                      </a:r>
+                    </a:p>
                   </a:txBody>
                   <a:tcPr marL="0" marR="0" marT="0" marB="0" anchor="ctr">
                     <a:lnL w="9525" cap="flat" cmpd="sng">
@@ -6775,19 +8082,35 @@
                   <a:txBody>
                     <a:bodyPr/>
                     <a:lstStyle/>
-                    <a:p/>
+                    <a:p>
+                      <a:pPr>
+                        <a:defRPr sz="900">
+                          <a:latin typeface="Arial"/>
+                        </a:defRPr>
+                      </a:pPr>
+                      <a:r>
+                        <a:t>-</a:t>
+                      </a:r>
+                    </a:p>
                   </a:txBody>
-                  <a:tcPr/>
+                  <a:tcPr anchor="ctr"/>
                 </a:tc>
                 <a:tc vMerge="1">
                   <a:txBody>
                     <a:bodyPr/>
                     <a:lstStyle/>
                     <a:p>
-                      <a:endParaRPr lang="en-US"/>
+                      <a:pPr>
+                        <a:defRPr sz="900">
+                          <a:latin typeface="Arial"/>
+                        </a:defRPr>
+                      </a:pPr>
+                      <a:r>
+                        <a:t>-</a:t>
+                      </a:r>
                     </a:p>
                   </a:txBody>
-                  <a:tcPr/>
+                  <a:tcPr anchor="ctr"/>
                 </a:tc>
                 <a:extLst>
                   <a:ext uri="{0D108BD9-81ED-4DB2-BD59-A6C34878D82A}">

</xml_diff>